<commit_message>
Modified future scope in presentation slightly and added integration testing explanation
</commit_message>
<xml_diff>
--- a/ChildAlertSystem/ProjectDocuments/ECE574_final_project.pptx
+++ b/ChildAlertSystem/ProjectDocuments/ECE574_final_project.pptx
@@ -21,7 +21,10 @@
     <p:sldId id="276" r:id="rId15"/>
     <p:sldId id="278" r:id="rId16"/>
     <p:sldId id="270" r:id="rId17"/>
-    <p:sldId id="271" r:id="rId18"/>
+    <p:sldId id="287" r:id="rId18"/>
+    <p:sldId id="283" r:id="rId19"/>
+    <p:sldId id="285" r:id="rId20"/>
+    <p:sldId id="286" r:id="rId21"/>
   </p:sldIdLst>
   <p:sldSz cx="9144000" cy="6858000" type="screen4x3"/>
   <p:notesSz cx="6858000" cy="9144000"/>
@@ -141,9 +144,7 @@
 
 <file path=ppt/commentAuthors.xml><?xml version="1.0" encoding="utf-8"?>
 <p:cmAuthorLst xmlns:a="http://schemas.openxmlformats.org/drawingml/2006/main" xmlns:r="http://schemas.openxmlformats.org/officeDocument/2006/relationships" xmlns:p="http://schemas.openxmlformats.org/presentationml/2006/main">
-  <p:cmAuthor id="1" name="Trishok K." initials="TK" lastIdx="3" clrIdx="0">
-    <p:extLst/>
-  </p:cmAuthor>
+  <p:cmAuthor id="1" name="Trishok K." initials="TK" lastIdx="3" clrIdx="0"/>
   <p:cmAuthor id="2" name="ckatkins" initials="c" lastIdx="0" clrIdx="1"/>
 </p:cmAuthorLst>
 </file>
@@ -7966,6 +7967,220 @@
           <a:p>
             <a:r>
               <a:rPr lang="en-US" dirty="0"/>
+              <a:t>Future Scope</a:t>
+            </a:r>
+          </a:p>
+        </p:txBody>
+      </p:sp>
+      <p:sp>
+        <p:nvSpPr>
+          <p:cNvPr id="5" name="Content Placeholder 5"/>
+          <p:cNvSpPr>
+            <a:spLocks noGrp="1"/>
+          </p:cNvSpPr>
+          <p:nvPr>
+            <p:ph sz="quarter" idx="2"/>
+          </p:nvPr>
+        </p:nvSpPr>
+        <p:spPr>
+          <a:xfrm>
+            <a:off x="457200" y="1295400"/>
+            <a:ext cx="8229600" cy="4876800"/>
+          </a:xfrm>
+        </p:spPr>
+        <p:txBody>
+          <a:bodyPr>
+            <a:normAutofit/>
+          </a:bodyPr>
+          <a:lstStyle/>
+          <a:p>
+            <a:pPr fontAlgn="base"/>
+            <a:r>
+              <a:rPr lang="en-US" sz="2700" i="1" dirty="0">
+                <a:effectLst>
+                  <a:outerShdw sx="0" sy="0">
+                    <a:srgbClr val="000000"/>
+                  </a:outerShdw>
+                </a:effectLst>
+              </a:rPr>
+              <a:t>Temperature sensor</a:t>
+            </a:r>
+          </a:p>
+          <a:p>
+            <a:pPr lvl="1"/>
+            <a:r>
+              <a:rPr lang="en-US" sz="2500" dirty="0"/>
+              <a:t>Include temperature with alert messages </a:t>
+            </a:r>
+            <a:r>
+              <a:rPr lang="en-US" dirty="0" smtClean="0"/>
+              <a:t>All </a:t>
+            </a:r>
+            <a:r>
+              <a:rPr lang="en-US" dirty="0"/>
+              <a:t>requirements successfully met</a:t>
+            </a:r>
+          </a:p>
+          <a:p>
+            <a:pPr fontAlgn="base"/>
+            <a:r>
+              <a:rPr lang="en-US" sz="2700" i="1" dirty="0">
+                <a:effectLst>
+                  <a:outerShdw sx="0" sy="0">
+                    <a:srgbClr val="000000"/>
+                  </a:outerShdw>
+                </a:effectLst>
+              </a:rPr>
+              <a:t>Adjustable Alert Intervals</a:t>
+            </a:r>
+          </a:p>
+          <a:p>
+            <a:pPr lvl="1" fontAlgn="base"/>
+            <a:r>
+              <a:rPr lang="en-US" sz="2400" i="1" dirty="0">
+                <a:effectLst>
+                  <a:outerShdw sx="0" sy="0">
+                    <a:srgbClr val="000000"/>
+                  </a:outerShdw>
+                </a:effectLst>
+              </a:rPr>
+              <a:t>Use temperature sensor to adjust alert interval</a:t>
+            </a:r>
+          </a:p>
+          <a:p>
+            <a:pPr lvl="1" fontAlgn="base"/>
+            <a:r>
+              <a:rPr lang="en-US" sz="2400" i="1" dirty="0">
+                <a:effectLst>
+                  <a:outerShdw sx="0" sy="0">
+                    <a:srgbClr val="000000"/>
+                  </a:outerShdw>
+                </a:effectLst>
+              </a:rPr>
+              <a:t>Shorter interval as temperature increases</a:t>
+            </a:r>
+          </a:p>
+          <a:p>
+            <a:pPr fontAlgn="base"/>
+            <a:r>
+              <a:rPr lang="en-US" sz="2700" i="1" dirty="0">
+                <a:effectLst>
+                  <a:outerShdw sx="0" sy="0">
+                    <a:srgbClr val="000000"/>
+                  </a:outerShdw>
+                </a:effectLst>
+              </a:rPr>
+              <a:t>Additional Sensors</a:t>
+            </a:r>
+          </a:p>
+          <a:p>
+            <a:pPr lvl="1" fontAlgn="base"/>
+            <a:r>
+              <a:rPr lang="en-US" sz="2400" i="1" dirty="0">
+                <a:effectLst>
+                  <a:outerShdw sx="0" sy="0">
+                    <a:srgbClr val="000000"/>
+                  </a:outerShdw>
+                </a:effectLst>
+              </a:rPr>
+              <a:t>Plug-and-play sensors</a:t>
+            </a:r>
+          </a:p>
+          <a:p>
+            <a:pPr lvl="1" fontAlgn="base"/>
+            <a:r>
+              <a:rPr lang="en-US" sz="2400" i="1" dirty="0">
+                <a:effectLst>
+                  <a:outerShdw sx="0" sy="0">
+                    <a:srgbClr val="000000"/>
+                  </a:outerShdw>
+                </a:effectLst>
+              </a:rPr>
+              <a:t>Allow for using an adult passenger as a proxy for the driver</a:t>
+            </a:r>
+          </a:p>
+          <a:p>
+            <a:pPr lvl="1" fontAlgn="base"/>
+            <a:r>
+              <a:rPr lang="en-US" sz="2400" i="1" dirty="0">
+                <a:effectLst>
+                  <a:outerShdw sx="0" sy="0">
+                    <a:srgbClr val="000000"/>
+                  </a:outerShdw>
+                </a:effectLst>
+              </a:rPr>
+              <a:t>Allow for monitoring multiple children</a:t>
+            </a:r>
+          </a:p>
+          <a:p>
+            <a:pPr lvl="1" fontAlgn="base"/>
+            <a:r>
+              <a:rPr lang="en-US" sz="2400" i="1" dirty="0">
+                <a:effectLst>
+                  <a:outerShdw sx="0" sy="0">
+                    <a:srgbClr val="000000"/>
+                  </a:outerShdw>
+                </a:effectLst>
+              </a:rPr>
+              <a:t>Use weight threshold to identify passenger as child or adult</a:t>
+            </a:r>
+            <a:endParaRPr lang="en-US" sz="2400" i="1" dirty="0">
+              <a:effectLst>
+                <a:outerShdw sx="0" sy="0">
+                  <a:srgbClr val="000000"/>
+                </a:outerShdw>
+              </a:effectLst>
+            </a:endParaRPr>
+          </a:p>
+        </p:txBody>
+      </p:sp>
+    </p:spTree>
+    <p:extLst>
+      <p:ext uri="{BB962C8B-B14F-4D97-AF65-F5344CB8AC3E}">
+        <p14:creationId xmlns:p14="http://schemas.microsoft.com/office/powerpoint/2010/main" val="2926932172"/>
+      </p:ext>
+    </p:extLst>
+  </p:cSld>
+  <p:clrMapOvr>
+    <a:masterClrMapping/>
+  </p:clrMapOvr>
+</p:sld>
+</file>
+
+<file path=ppt/slides/slide18.xml><?xml version="1.0" encoding="utf-8"?>
+<p:sld xmlns:a="http://schemas.openxmlformats.org/drawingml/2006/main" xmlns:r="http://schemas.openxmlformats.org/officeDocument/2006/relationships" xmlns:p="http://schemas.openxmlformats.org/presentationml/2006/main">
+  <p:cSld>
+    <p:spTree>
+      <p:nvGrpSpPr>
+        <p:cNvPr id="1" name=""/>
+        <p:cNvGrpSpPr/>
+        <p:nvPr/>
+      </p:nvGrpSpPr>
+      <p:grpSpPr>
+        <a:xfrm>
+          <a:off x="0" y="0"/>
+          <a:ext cx="0" cy="0"/>
+          <a:chOff x="0" y="0"/>
+          <a:chExt cx="0" cy="0"/>
+        </a:xfrm>
+      </p:grpSpPr>
+      <p:sp>
+        <p:nvSpPr>
+          <p:cNvPr id="4" name="Title 3"/>
+          <p:cNvSpPr>
+            <a:spLocks noGrp="1"/>
+          </p:cNvSpPr>
+          <p:nvPr>
+            <p:ph type="title"/>
+          </p:nvPr>
+        </p:nvSpPr>
+        <p:spPr/>
+        <p:txBody>
+          <a:bodyPr/>
+          <a:lstStyle/>
+          <a:p>
+            <a:r>
+              <a:rPr lang="en-US" dirty="0"/>
               <a:t>Conclusion</a:t>
             </a:r>
           </a:p>
@@ -8021,7 +8236,239 @@
     </p:spTree>
     <p:extLst>
       <p:ext uri="{BB962C8B-B14F-4D97-AF65-F5344CB8AC3E}">
-        <p14:creationId xmlns:p14="http://schemas.microsoft.com/office/powerpoint/2010/main" val="2629970162"/>
+        <p14:creationId xmlns:p14="http://schemas.microsoft.com/office/powerpoint/2010/main" val="1544150675"/>
+      </p:ext>
+    </p:extLst>
+  </p:cSld>
+  <p:clrMapOvr>
+    <a:masterClrMapping/>
+  </p:clrMapOvr>
+</p:sld>
+</file>
+
+<file path=ppt/slides/slide19.xml><?xml version="1.0" encoding="utf-8"?>
+<p:sld xmlns:a="http://schemas.openxmlformats.org/drawingml/2006/main" xmlns:r="http://schemas.openxmlformats.org/officeDocument/2006/relationships" xmlns:p="http://schemas.openxmlformats.org/presentationml/2006/main">
+  <p:cSld>
+    <p:spTree>
+      <p:nvGrpSpPr>
+        <p:cNvPr id="1" name=""/>
+        <p:cNvGrpSpPr/>
+        <p:nvPr/>
+      </p:nvGrpSpPr>
+      <p:grpSpPr>
+        <a:xfrm>
+          <a:off x="0" y="0"/>
+          <a:ext cx="0" cy="0"/>
+          <a:chOff x="0" y="0"/>
+          <a:chExt cx="0" cy="0"/>
+        </a:xfrm>
+      </p:grpSpPr>
+      <p:sp>
+        <p:nvSpPr>
+          <p:cNvPr id="4" name="Title 3"/>
+          <p:cNvSpPr>
+            <a:spLocks noGrp="1"/>
+          </p:cNvSpPr>
+          <p:nvPr>
+            <p:ph type="title"/>
+          </p:nvPr>
+        </p:nvSpPr>
+        <p:spPr/>
+        <p:txBody>
+          <a:bodyPr/>
+          <a:lstStyle/>
+          <a:p>
+            <a:r>
+              <a:rPr lang="en-US" dirty="0"/>
+              <a:t>References</a:t>
+            </a:r>
+          </a:p>
+        </p:txBody>
+      </p:sp>
+      <p:sp>
+        <p:nvSpPr>
+          <p:cNvPr id="6" name="Content Placeholder 5"/>
+          <p:cNvSpPr>
+            <a:spLocks noGrp="1"/>
+          </p:cNvSpPr>
+          <p:nvPr>
+            <p:ph sz="quarter" idx="2"/>
+          </p:nvPr>
+        </p:nvSpPr>
+        <p:spPr>
+          <a:xfrm>
+            <a:off x="457200" y="1295400"/>
+            <a:ext cx="8229600" cy="4876800"/>
+          </a:xfrm>
+        </p:spPr>
+        <p:txBody>
+          <a:bodyPr>
+            <a:normAutofit fontScale="62500" lnSpcReduction="20000"/>
+          </a:bodyPr>
+          <a:lstStyle/>
+          <a:p>
+            <a:pPr lvl="0"/>
+            <a:r>
+              <a:rPr lang="en-US" dirty="0"/>
+              <a:t>Willingham, A. (2018, July 20). </a:t>
+            </a:r>
+            <a:r>
+              <a:rPr lang="en-US" i="1" dirty="0"/>
+              <a:t>Hot Car Deaths Child Charts Graphs</a:t>
+            </a:r>
+            <a:r>
+              <a:rPr lang="en-US" dirty="0"/>
+              <a:t>. Retrieved 11 28, 2019, from CNN: https://www.cnn.com/2018/07/03/health/hot-car-deaths-child-charts-graphs-trnd/index.html</a:t>
+            </a:r>
+          </a:p>
+          <a:p>
+            <a:pPr lvl="0"/>
+            <a:r>
+              <a:rPr lang="en-US" dirty="0" err="1"/>
+              <a:t>Sprovieri</a:t>
+            </a:r>
+            <a:r>
+              <a:rPr lang="en-US" dirty="0"/>
+              <a:t>, J. (2014, July 1). </a:t>
+            </a:r>
+            <a:r>
+              <a:rPr lang="en-US" i="1" dirty="0"/>
+              <a:t>Wire Harness Recycling</a:t>
+            </a:r>
+            <a:r>
+              <a:rPr lang="en-US" dirty="0"/>
+              <a:t>. Retrieved 11 28, 2019, from Assembly Mag: https://www.assemblymag.com/articles/92263-wire-harness-recycling</a:t>
+            </a:r>
+          </a:p>
+          <a:p>
+            <a:pPr lvl="0"/>
+            <a:r>
+              <a:rPr lang="en-US" dirty="0"/>
+              <a:t>Miller, S. S. (2019, 8 9). </a:t>
+            </a:r>
+            <a:r>
+              <a:rPr lang="en-US" i="1" dirty="0"/>
+              <a:t>High-tech alarms go off when kids are left in hot cars</a:t>
+            </a:r>
+            <a:r>
+              <a:rPr lang="en-US" dirty="0"/>
+              <a:t>. Retrieved 11 28, 2019, from Mashable: </a:t>
+            </a:r>
+            <a:r>
+              <a:rPr lang="en-US" u="sng" dirty="0">
+                <a:hlinkClick r:id="rId2"/>
+              </a:rPr>
+              <a:t>https://mashable.com/article/car-seat-alarms-prevent-hot-car-death</a:t>
+            </a:r>
+            <a:endParaRPr lang="en-US" dirty="0"/>
+          </a:p>
+          <a:p>
+            <a:pPr lvl="0"/>
+            <a:r>
+              <a:rPr lang="en-US" dirty="0"/>
+              <a:t>Baldwin, D. (2019, 8 21). Life-Saving Car Seat Alarms That Remind Parents There’s a Baby in the Back Seat. Retrieved 28 11, 2019, from Fatherly: https://www.fatherly.com/gear/best-car-seat-alarms/</a:t>
+            </a:r>
+          </a:p>
+          <a:p>
+            <a:pPr lvl="0"/>
+            <a:r>
+              <a:rPr lang="en-US" dirty="0"/>
+              <a:t>Marcoux, H. (2019, 7 18). 5 safety apps that remind parents there's a baby in the back seat. Retrieved 11 28, 2019, from Motherly: https://www.mother.ly/news/best-car-seat-sensor-app?rebelltitem=5#rebelltitem5</a:t>
+            </a:r>
+          </a:p>
+          <a:p>
+            <a:pPr lvl="0"/>
+            <a:r>
+              <a:rPr lang="en-US" dirty="0"/>
+              <a:t>Wikipedia. (2019, 11 07). </a:t>
+            </a:r>
+            <a:r>
+              <a:rPr lang="en-US" i="1" dirty="0"/>
+              <a:t>Strain Gauge</a:t>
+            </a:r>
+            <a:r>
+              <a:rPr lang="en-US" dirty="0"/>
+              <a:t>. Retrieved 11 28, 2019, from Wikipedia: </a:t>
+            </a:r>
+            <a:r>
+              <a:rPr lang="en-US" u="sng" dirty="0">
+                <a:hlinkClick r:id="rId3"/>
+              </a:rPr>
+              <a:t>https://en.wikipedia.org/wiki/Strain_gauge</a:t>
+            </a:r>
+            <a:endParaRPr lang="en-US" dirty="0"/>
+          </a:p>
+          <a:p>
+            <a:pPr lvl="0"/>
+            <a:r>
+              <a:rPr lang="en-US" dirty="0"/>
+              <a:t>Wikipedia. (2019, November 27). </a:t>
+            </a:r>
+            <a:r>
+              <a:rPr lang="en-US" i="1" dirty="0"/>
+              <a:t>Wheatstone Bridge</a:t>
+            </a:r>
+            <a:r>
+              <a:rPr lang="en-US" dirty="0"/>
+              <a:t>. Retrieved 11 28, 2019, from Wikipedia: https://en.wikipedia.org/wiki/Wheatstone_bridge</a:t>
+            </a:r>
+          </a:p>
+          <a:p>
+            <a:pPr lvl="0"/>
+            <a:r>
+              <a:rPr lang="en-US" dirty="0"/>
+              <a:t>Avia Semiconductor. (2017, 1 1). </a:t>
+            </a:r>
+            <a:r>
+              <a:rPr lang="en-US" i="1" dirty="0"/>
+              <a:t>HX711</a:t>
+            </a:r>
+            <a:r>
+              <a:rPr lang="en-US" dirty="0"/>
+              <a:t>. Retrieved 11 28, 2019, from </a:t>
+            </a:r>
+            <a:r>
+              <a:rPr lang="en-US" dirty="0" err="1"/>
+              <a:t>alldatasheet</a:t>
+            </a:r>
+            <a:r>
+              <a:rPr lang="en-US" dirty="0"/>
+              <a:t>: https://www.alldatasheet.com/datasheet-pdf/pdf/1132222/AVIA/HX711.html</a:t>
+            </a:r>
+          </a:p>
+          <a:p>
+            <a:pPr lvl="0"/>
+            <a:r>
+              <a:rPr lang="en-US" dirty="0" err="1"/>
+              <a:t>Digikey</a:t>
+            </a:r>
+            <a:r>
+              <a:rPr lang="en-US" dirty="0"/>
+              <a:t>. (2014, 5 28). </a:t>
+            </a:r>
+            <a:r>
+              <a:rPr lang="en-US" i="1" dirty="0" err="1"/>
+              <a:t>Schemeit</a:t>
+            </a:r>
+            <a:r>
+              <a:rPr lang="en-US" dirty="0"/>
+              <a:t>. Retrieved 11 28, 2019, from </a:t>
+            </a:r>
+            <a:r>
+              <a:rPr lang="en-US" dirty="0" err="1"/>
+              <a:t>Digikey</a:t>
+            </a:r>
+            <a:r>
+              <a:rPr lang="en-US" dirty="0"/>
+              <a:t>: https://www.digikey.com/schemeit/project</a:t>
+            </a:r>
+          </a:p>
+        </p:txBody>
+      </p:sp>
+    </p:spTree>
+    <p:extLst>
+      <p:ext uri="{BB962C8B-B14F-4D97-AF65-F5344CB8AC3E}">
+        <p14:creationId xmlns:p14="http://schemas.microsoft.com/office/powerpoint/2010/main" val="1473190690"/>
       </p:ext>
     </p:extLst>
   </p:cSld>
@@ -8138,6 +8585,307 @@
     <p:extLst>
       <p:ext uri="{BB962C8B-B14F-4D97-AF65-F5344CB8AC3E}">
         <p14:creationId xmlns:p14="http://schemas.microsoft.com/office/powerpoint/2010/main" val="612855696"/>
+      </p:ext>
+    </p:extLst>
+  </p:cSld>
+  <p:clrMapOvr>
+    <a:masterClrMapping/>
+  </p:clrMapOvr>
+</p:sld>
+</file>
+
+<file path=ppt/slides/slide20.xml><?xml version="1.0" encoding="utf-8"?>
+<p:sld xmlns:a="http://schemas.openxmlformats.org/drawingml/2006/main" xmlns:r="http://schemas.openxmlformats.org/officeDocument/2006/relationships" xmlns:p="http://schemas.openxmlformats.org/presentationml/2006/main">
+  <p:cSld>
+    <p:spTree>
+      <p:nvGrpSpPr>
+        <p:cNvPr id="1" name=""/>
+        <p:cNvGrpSpPr/>
+        <p:nvPr/>
+      </p:nvGrpSpPr>
+      <p:grpSpPr>
+        <a:xfrm>
+          <a:off x="0" y="0"/>
+          <a:ext cx="0" cy="0"/>
+          <a:chOff x="0" y="0"/>
+          <a:chExt cx="0" cy="0"/>
+        </a:xfrm>
+      </p:grpSpPr>
+      <p:sp>
+        <p:nvSpPr>
+          <p:cNvPr id="4" name="Title 3"/>
+          <p:cNvSpPr>
+            <a:spLocks noGrp="1"/>
+          </p:cNvSpPr>
+          <p:nvPr>
+            <p:ph type="title"/>
+          </p:nvPr>
+        </p:nvSpPr>
+        <p:spPr/>
+        <p:txBody>
+          <a:bodyPr/>
+          <a:lstStyle/>
+          <a:p>
+            <a:r>
+              <a:rPr lang="en-US" dirty="0"/>
+              <a:t>References</a:t>
+            </a:r>
+          </a:p>
+        </p:txBody>
+      </p:sp>
+      <p:sp>
+        <p:nvSpPr>
+          <p:cNvPr id="6" name="Content Placeholder 5"/>
+          <p:cNvSpPr>
+            <a:spLocks noGrp="1"/>
+          </p:cNvSpPr>
+          <p:nvPr>
+            <p:ph sz="quarter" idx="2"/>
+          </p:nvPr>
+        </p:nvSpPr>
+        <p:spPr>
+          <a:xfrm>
+            <a:off x="457200" y="1295400"/>
+            <a:ext cx="8229600" cy="4876800"/>
+          </a:xfrm>
+        </p:spPr>
+        <p:txBody>
+          <a:bodyPr>
+            <a:normAutofit fontScale="55000" lnSpcReduction="20000"/>
+          </a:bodyPr>
+          <a:lstStyle/>
+          <a:p>
+            <a:pPr lvl="0"/>
+            <a:r>
+              <a:rPr lang="en-US" i="1" dirty="0"/>
+              <a:t>Software</a:t>
+            </a:r>
+            <a:r>
+              <a:rPr lang="en-US" dirty="0"/>
+              <a:t>. (2015, 5 15). Retrieved 11 28, 2019, from Arduino: https://www.arduino.cc/en/Main/Software</a:t>
+            </a:r>
+          </a:p>
+          <a:p>
+            <a:pPr lvl="0"/>
+            <a:r>
+              <a:rPr lang="en-US" dirty="0"/>
+              <a:t>Wikipedia. (2019, 11 5). </a:t>
+            </a:r>
+            <a:r>
+              <a:rPr lang="en-US" i="1" dirty="0"/>
+              <a:t>MQTT</a:t>
+            </a:r>
+            <a:r>
+              <a:rPr lang="en-US" dirty="0"/>
+              <a:t>. Retrieved 11 28, 2019, from Wikipedia: https://en.wikipedia.org/wiki/MQTT</a:t>
+            </a:r>
+          </a:p>
+          <a:p>
+            <a:r>
+              <a:rPr lang="en-US" dirty="0"/>
+              <a:t>Fahad, E. (2019, 4 27). </a:t>
+            </a:r>
+            <a:r>
+              <a:rPr lang="en-US" i="1" dirty="0"/>
+              <a:t>HX711 Load cell or Strain Gauge and Arduino</a:t>
+            </a:r>
+            <a:r>
+              <a:rPr lang="en-US" dirty="0"/>
+              <a:t>. Retrieved 11 28, 2019, from Electronic </a:t>
+            </a:r>
+            <a:r>
+              <a:rPr lang="en-US" dirty="0" err="1"/>
+              <a:t>CLinic</a:t>
+            </a:r>
+            <a:r>
+              <a:rPr lang="en-US" dirty="0"/>
+              <a:t>: </a:t>
+            </a:r>
+            <a:r>
+              <a:rPr lang="en-US" u="sng" dirty="0">
+                <a:hlinkClick r:id="rId2"/>
+              </a:rPr>
+              <a:t>https://www.electroniclinic.com/hx711-load-cell-or-strain-gauge-and-arduino</a:t>
+            </a:r>
+            <a:endParaRPr lang="en-US" dirty="0"/>
+          </a:p>
+          <a:p>
+            <a:r>
+              <a:rPr lang="en-US" dirty="0"/>
+              <a:t>AWS IoT Developer Guide  </a:t>
+            </a:r>
+            <a:r>
+              <a:rPr lang="en-US" dirty="0" err="1"/>
+              <a:t>Retreived</a:t>
+            </a:r>
+            <a:r>
+              <a:rPr lang="en-US" dirty="0"/>
+              <a:t> 11 28, 2019, from AWS Console: </a:t>
+            </a:r>
+            <a:r>
+              <a:rPr lang="en-US" u="sng" dirty="0">
+                <a:hlinkClick r:id="rId3"/>
+              </a:rPr>
+              <a:t>https://docs.amazonaws.cn/en_us/iot/latest/developerguide/iot-dg.pdf</a:t>
+            </a:r>
+            <a:endParaRPr lang="en-US" dirty="0"/>
+          </a:p>
+          <a:p>
+            <a:r>
+              <a:rPr lang="en-US" dirty="0"/>
+              <a:t> </a:t>
+            </a:r>
+            <a:r>
+              <a:rPr lang="en-US" dirty="0" err="1"/>
+              <a:t>Annaconda</a:t>
+            </a:r>
+            <a:r>
+              <a:rPr lang="en-US" dirty="0"/>
+              <a:t> Python Software Download, </a:t>
+            </a:r>
+            <a:r>
+              <a:rPr lang="en-US" dirty="0" err="1"/>
+              <a:t>Retreived</a:t>
+            </a:r>
+            <a:r>
+              <a:rPr lang="en-US" dirty="0"/>
+              <a:t> 11 28, 2019 from Anaconda Distributions: </a:t>
+            </a:r>
+            <a:r>
+              <a:rPr lang="en-US" u="sng" dirty="0">
+                <a:hlinkClick r:id="rId4"/>
+              </a:rPr>
+              <a:t>https://www.anaconda.com/distribution/</a:t>
+            </a:r>
+            <a:r>
+              <a:rPr lang="en-US" dirty="0"/>
+              <a:t>   </a:t>
+            </a:r>
+          </a:p>
+          <a:p>
+            <a:r>
+              <a:rPr lang="en-US" dirty="0"/>
+              <a:t> Anaconda Python    Documentation for reference, </a:t>
+            </a:r>
+            <a:r>
+              <a:rPr lang="en-US" dirty="0" err="1"/>
+              <a:t>Retreived</a:t>
+            </a:r>
+            <a:r>
+              <a:rPr lang="en-US" dirty="0"/>
+              <a:t> 11 28, 2019 from Anaconda Distribution </a:t>
+            </a:r>
+            <a:r>
+              <a:rPr lang="en-US" u="sng" dirty="0">
+                <a:hlinkClick r:id="rId5"/>
+              </a:rPr>
+              <a:t>https://docs.anaconda.com/anaconda/</a:t>
+            </a:r>
+            <a:r>
+              <a:rPr lang="en-US" dirty="0"/>
+              <a:t>     </a:t>
+            </a:r>
+          </a:p>
+          <a:p>
+            <a:r>
+              <a:rPr lang="en-US" dirty="0"/>
+              <a:t>  AWS IoT </a:t>
+            </a:r>
+            <a:r>
+              <a:rPr lang="en-US" dirty="0" err="1"/>
+              <a:t>Retreived</a:t>
+            </a:r>
+            <a:r>
+              <a:rPr lang="en-US" dirty="0"/>
+              <a:t> 11, 28, 2019 from AWS IoT Console: </a:t>
+            </a:r>
+            <a:r>
+              <a:rPr lang="en-US" u="sng" dirty="0">
+                <a:hlinkClick r:id="rId6"/>
+              </a:rPr>
+              <a:t>https://docs.aws.amazon.com/iot/latest/developerguide/what-is-aws-iot.html</a:t>
+            </a:r>
+            <a:endParaRPr lang="en-US" dirty="0"/>
+          </a:p>
+          <a:p>
+            <a:r>
+              <a:rPr lang="en-US" dirty="0"/>
+              <a:t> TCP/IP Socket Programming for server </a:t>
+            </a:r>
+            <a:r>
+              <a:rPr lang="en-US" dirty="0" err="1"/>
+              <a:t>connction</a:t>
+            </a:r>
+            <a:r>
+              <a:rPr lang="en-US" dirty="0"/>
+              <a:t>, </a:t>
+            </a:r>
+            <a:r>
+              <a:rPr lang="en-US" dirty="0" err="1"/>
+              <a:t>Retreived</a:t>
+            </a:r>
+            <a:r>
+              <a:rPr lang="en-US" dirty="0"/>
+              <a:t> 11,28,2109:</a:t>
+            </a:r>
+          </a:p>
+          <a:p>
+            <a:r>
+              <a:rPr lang="en-US" u="sng" dirty="0">
+                <a:hlinkClick r:id="rId7"/>
+              </a:rPr>
+              <a:t>https://pymotw.com/2/socket/tcp.html</a:t>
+            </a:r>
+            <a:endParaRPr lang="en-US" dirty="0"/>
+          </a:p>
+          <a:p>
+            <a:r>
+              <a:rPr lang="en-US" dirty="0"/>
+              <a:t>  Setting Calibration Factor  for load cells, </a:t>
+            </a:r>
+            <a:r>
+              <a:rPr lang="en-US" dirty="0" err="1"/>
+              <a:t>Retreived</a:t>
+            </a:r>
+            <a:r>
+              <a:rPr lang="en-US" dirty="0"/>
+              <a:t> 11,28,2019: </a:t>
+            </a:r>
+            <a:r>
+              <a:rPr lang="en-US" u="sng" dirty="0">
+                <a:hlinkClick r:id="rId8"/>
+              </a:rPr>
+              <a:t>https://gist.github.com/matt448/14d118e2fc5b6217da11</a:t>
+            </a:r>
+            <a:endParaRPr lang="en-US" dirty="0"/>
+          </a:p>
+          <a:p>
+            <a:r>
+              <a:rPr lang="en-US" dirty="0"/>
+              <a:t>  Connecting the HX711  to a three wire load  Cells , </a:t>
+            </a:r>
+            <a:r>
+              <a:rPr lang="en-US" dirty="0" err="1"/>
+              <a:t>Retreived</a:t>
+            </a:r>
+            <a:r>
+              <a:rPr lang="en-US" dirty="0"/>
+              <a:t> 11,28,2019</a:t>
+            </a:r>
+            <a:r>
+              <a:rPr lang="en-US" u="sng" dirty="0">
+                <a:hlinkClick r:id="rId9"/>
+              </a:rPr>
+              <a:t>https://electronics.stackexchange.com/questions/199487/connect-hx711-to-a-three-wire-load-cell</a:t>
+            </a:r>
+            <a:endParaRPr lang="en-US" dirty="0"/>
+          </a:p>
+        </p:txBody>
+      </p:sp>
+    </p:spTree>
+    <p:extLst>
+      <p:ext uri="{BB962C8B-B14F-4D97-AF65-F5344CB8AC3E}">
+        <p14:creationId xmlns:p14="http://schemas.microsoft.com/office/powerpoint/2010/main" val="2216523980"/>
       </p:ext>
     </p:extLst>
   </p:cSld>
@@ -13288,34 +14036,29 @@
           <a:p>
             <a:r>
               <a:rPr lang="en-US" dirty="0"/>
-              <a:t>Project used the Agile methodology throughout </a:t>
-            </a:r>
-            <a:r>
-              <a:rPr lang="en-US" dirty="0" smtClean="0"/>
-              <a:t>development for several reasons:</a:t>
+              <a:t>Project used the Agile methodology throughout development for several reasons:</a:t>
             </a:r>
           </a:p>
           <a:p>
             <a:pPr lvl="1"/>
             <a:r>
-              <a:rPr lang="en-US" dirty="0" smtClean="0"/>
+              <a:rPr lang="en-US" dirty="0"/>
               <a:t>Short project timeline</a:t>
             </a:r>
           </a:p>
           <a:p>
             <a:pPr lvl="1"/>
             <a:r>
-              <a:rPr lang="en-US" dirty="0" smtClean="0"/>
+              <a:rPr lang="en-US" dirty="0"/>
               <a:t>Rapid development</a:t>
             </a:r>
           </a:p>
           <a:p>
             <a:pPr lvl="1"/>
             <a:r>
-              <a:rPr lang="en-US" dirty="0" smtClean="0"/>
+              <a:rPr lang="en-US" dirty="0"/>
               <a:t>Adaptation to changes</a:t>
             </a:r>
-            <a:endParaRPr lang="en-US" dirty="0"/>
           </a:p>
           <a:p>
             <a:r>

</xml_diff>